<commit_message>
Performance Analysis and made sure release build ready & functioning for demo
</commit_message>
<xml_diff>
--- a/Milestones/FinalDemo.pptx
+++ b/Milestones/FinalDemo.pptx
@@ -8,8 +8,9 @@
     <p:sldId id="256" r:id="rId2"/>
     <p:sldId id="258" r:id="rId3"/>
     <p:sldId id="257" r:id="rId4"/>
-    <p:sldId id="259" r:id="rId5"/>
-    <p:sldId id="263" r:id="rId6"/>
+    <p:sldId id="263" r:id="rId5"/>
+    <p:sldId id="264" r:id="rId6"/>
+    <p:sldId id="259" r:id="rId7"/>
   </p:sldIdLst>
   <p:sldSz cx="12192000" cy="6858000"/>
   <p:notesSz cx="6858000" cy="9144000"/>
@@ -12583,7 +12584,7 @@
           <a:p>
             <a:r>
               <a:rPr lang="en-US" dirty="0"/>
-              <a:t>Use GPU to accelerate circuit solution, especially for very large circuits</a:t>
+              <a:t>Use GPU to accelerate circuit solution, especially for very large circuits (e.g. VLSI design)</a:t>
             </a:r>
           </a:p>
           <a:p>
@@ -12681,7 +12682,10 @@
           <a:bodyPr/>
           <a:lstStyle/>
           <a:p>
-            <a:endParaRPr lang="en-US" dirty="0"/>
+            <a:r>
+              <a:rPr lang="en-US" dirty="0"/>
+              <a:t>Features</a:t>
+            </a:r>
           </a:p>
         </p:txBody>
       </p:sp>
@@ -12706,7 +12710,36 @@
           <a:bodyPr/>
           <a:lstStyle/>
           <a:p>
-            <a:endParaRPr lang="en-US"/>
+            <a:r>
+              <a:rPr lang="en-US" dirty="0"/>
+              <a:t>Simple GUI – file and simulation selection</a:t>
+            </a:r>
+          </a:p>
+          <a:p>
+            <a:r>
+              <a:rPr lang="en-US" dirty="0"/>
+              <a:t>Partial SPICE file parsing (capacitors, resistors, DC &amp; pulse voltage sources, DC current and VCC sources, MOSFETs and their model files) on CPU, with copy of netlist on GPU for simulation</a:t>
+            </a:r>
+          </a:p>
+          <a:p>
+            <a:r>
+              <a:rPr lang="en-US" dirty="0"/>
+              <a:t>Operating point, DC Sweep, and Transient simulation completely on GPU (except for final output and control loops)</a:t>
+            </a:r>
+          </a:p>
+          <a:p>
+            <a:r>
+              <a:rPr lang="en-US" dirty="0"/>
+              <a:t>Outputs solutions to CSV file for easy plotting using Excel or a </a:t>
+            </a:r>
+            <a:r>
+              <a:rPr lang="en-US" dirty="0" err="1"/>
+              <a:t>MatLab</a:t>
+            </a:r>
+            <a:r>
+              <a:rPr lang="en-US" dirty="0"/>
+              <a:t> script</a:t>
+            </a:r>
           </a:p>
         </p:txBody>
       </p:sp>
@@ -12724,6 +12757,358 @@
 </file>
 
 <file path=ppt/slides/slide4.xml><?xml version="1.0" encoding="utf-8"?>
+<p:sld xmlns:a="http://schemas.openxmlformats.org/drawingml/2006/main" xmlns:r="http://schemas.openxmlformats.org/officeDocument/2006/relationships" xmlns:p="http://schemas.openxmlformats.org/presentationml/2006/main">
+  <p:cSld>
+    <p:spTree>
+      <p:nvGrpSpPr>
+        <p:cNvPr id="1" name=""/>
+        <p:cNvGrpSpPr/>
+        <p:nvPr/>
+      </p:nvGrpSpPr>
+      <p:grpSpPr>
+        <a:xfrm>
+          <a:off x="0" y="0"/>
+          <a:ext cx="0" cy="0"/>
+          <a:chOff x="0" y="0"/>
+          <a:chExt cx="0" cy="0"/>
+        </a:xfrm>
+      </p:grpSpPr>
+      <p:sp>
+        <p:nvSpPr>
+          <p:cNvPr id="2" name="Title 1">
+            <a:extLst>
+              <a:ext uri="{FF2B5EF4-FFF2-40B4-BE49-F238E27FC236}">
+                <a16:creationId xmlns:a16="http://schemas.microsoft.com/office/drawing/2014/main" id="{E823E6C6-D0AF-4BD1-81D1-AFC9B8386020}"/>
+              </a:ext>
+            </a:extLst>
+          </p:cNvPr>
+          <p:cNvSpPr>
+            <a:spLocks noGrp="1"/>
+          </p:cNvSpPr>
+          <p:nvPr>
+            <p:ph type="title"/>
+          </p:nvPr>
+        </p:nvSpPr>
+        <p:spPr/>
+        <p:txBody>
+          <a:bodyPr/>
+          <a:lstStyle/>
+          <a:p>
+            <a:r>
+              <a:rPr lang="en-US" dirty="0"/>
+              <a:t>Solving NON-Linear Circuits</a:t>
+            </a:r>
+          </a:p>
+        </p:txBody>
+      </p:sp>
+      <p:sp>
+        <p:nvSpPr>
+          <p:cNvPr id="4" name="Content Placeholder 3">
+            <a:extLst>
+              <a:ext uri="{FF2B5EF4-FFF2-40B4-BE49-F238E27FC236}">
+                <a16:creationId xmlns:a16="http://schemas.microsoft.com/office/drawing/2014/main" id="{F8AF968B-9CEE-45F0-925D-08B997D30EDD}"/>
+              </a:ext>
+            </a:extLst>
+          </p:cNvPr>
+          <p:cNvSpPr>
+            <a:spLocks noGrp="1"/>
+          </p:cNvSpPr>
+          <p:nvPr>
+            <p:ph idx="1"/>
+          </p:nvPr>
+        </p:nvSpPr>
+        <p:spPr/>
+        <p:txBody>
+          <a:bodyPr>
+            <a:normAutofit fontScale="92500"/>
+          </a:bodyPr>
+          <a:lstStyle/>
+          <a:p>
+            <a:r>
+              <a:rPr lang="en-US" dirty="0"/>
+              <a:t>Each circuit element is linearized into Conductance (G) and Current (</a:t>
+            </a:r>
+            <a:r>
+              <a:rPr lang="en-US" dirty="0">
+                <a:latin typeface="Times New Roman" panose="02020603050405020304" pitchFamily="18" charset="0"/>
+                <a:cs typeface="Times New Roman" panose="02020603050405020304" pitchFamily="18" charset="0"/>
+              </a:rPr>
+              <a:t>I</a:t>
+            </a:r>
+            <a:r>
+              <a:rPr lang="en-US" dirty="0"/>
+              <a:t>) elements</a:t>
+            </a:r>
+          </a:p>
+          <a:p>
+            <a:r>
+              <a:rPr lang="en-US" dirty="0"/>
+              <a:t>Parallel population of G and </a:t>
+            </a:r>
+            <a:r>
+              <a:rPr lang="en-US" dirty="0">
+                <a:latin typeface="Times New Roman" panose="02020603050405020304" pitchFamily="18" charset="0"/>
+                <a:cs typeface="Times New Roman" panose="02020603050405020304" pitchFamily="18" charset="0"/>
+              </a:rPr>
+              <a:t>I</a:t>
+            </a:r>
+            <a:r>
+              <a:rPr lang="en-US" dirty="0"/>
+              <a:t> matrices using atomic addition, parallel solution of voltage(V) matrix using linear matrix reduction and solution</a:t>
+            </a:r>
+          </a:p>
+          <a:p>
+            <a:r>
+              <a:rPr lang="en-US" dirty="0"/>
+              <a:t>MOSFETs solved by successive “guessing” until convergence (Newton-Raphson)</a:t>
+            </a:r>
+          </a:p>
+          <a:p>
+            <a:pPr lvl="1"/>
+            <a:r>
+              <a:rPr lang="en-US" dirty="0"/>
+              <a:t>Serial iteration of parallel solver until converges within tolerance</a:t>
+            </a:r>
+          </a:p>
+          <a:p>
+            <a:r>
+              <a:rPr lang="en-US" dirty="0"/>
+              <a:t>Capacitances in transient approximated using Backward Euler</a:t>
+            </a:r>
+          </a:p>
+          <a:p>
+            <a:pPr lvl="1"/>
+            <a:r>
+              <a:rPr lang="en-US" dirty="0"/>
+              <a:t>Must serially iterate each time-step, as it is reliant on prev. step’s solution</a:t>
+            </a:r>
+          </a:p>
+        </p:txBody>
+      </p:sp>
+    </p:spTree>
+    <p:extLst>
+      <p:ext uri="{BB962C8B-B14F-4D97-AF65-F5344CB8AC3E}">
+        <p14:creationId xmlns:p14="http://schemas.microsoft.com/office/powerpoint/2010/main" val="5450685"/>
+      </p:ext>
+    </p:extLst>
+  </p:cSld>
+  <p:clrMapOvr>
+    <a:masterClrMapping/>
+  </p:clrMapOvr>
+</p:sld>
+</file>
+
+<file path=ppt/slides/slide5.xml><?xml version="1.0" encoding="utf-8"?>
+<p:sld xmlns:a="http://schemas.openxmlformats.org/drawingml/2006/main" xmlns:r="http://schemas.openxmlformats.org/officeDocument/2006/relationships" xmlns:p="http://schemas.openxmlformats.org/presentationml/2006/main">
+  <p:cSld>
+    <p:spTree>
+      <p:nvGrpSpPr>
+        <p:cNvPr id="1" name=""/>
+        <p:cNvGrpSpPr/>
+        <p:nvPr/>
+      </p:nvGrpSpPr>
+      <p:grpSpPr>
+        <a:xfrm>
+          <a:off x="0" y="0"/>
+          <a:ext cx="0" cy="0"/>
+          <a:chOff x="0" y="0"/>
+          <a:chExt cx="0" cy="0"/>
+        </a:xfrm>
+      </p:grpSpPr>
+      <p:sp>
+        <p:nvSpPr>
+          <p:cNvPr id="2" name="Title 1">
+            <a:extLst>
+              <a:ext uri="{FF2B5EF4-FFF2-40B4-BE49-F238E27FC236}">
+                <a16:creationId xmlns:a16="http://schemas.microsoft.com/office/drawing/2014/main" id="{C57AD44F-9E15-412D-9860-1925162593AE}"/>
+              </a:ext>
+            </a:extLst>
+          </p:cNvPr>
+          <p:cNvSpPr>
+            <a:spLocks noGrp="1"/>
+          </p:cNvSpPr>
+          <p:nvPr>
+            <p:ph type="title"/>
+          </p:nvPr>
+        </p:nvSpPr>
+        <p:spPr/>
+        <p:txBody>
+          <a:bodyPr/>
+          <a:lstStyle/>
+          <a:p>
+            <a:r>
+              <a:rPr lang="en-US" dirty="0"/>
+              <a:t>Performance</a:t>
+            </a:r>
+          </a:p>
+        </p:txBody>
+      </p:sp>
+      <p:sp>
+        <p:nvSpPr>
+          <p:cNvPr id="3" name="Content Placeholder 2">
+            <a:extLst>
+              <a:ext uri="{FF2B5EF4-FFF2-40B4-BE49-F238E27FC236}">
+                <a16:creationId xmlns:a16="http://schemas.microsoft.com/office/drawing/2014/main" id="{994B29B6-5010-4BDB-9D5B-4501E4CD6E74}"/>
+              </a:ext>
+            </a:extLst>
+          </p:cNvPr>
+          <p:cNvSpPr>
+            <a:spLocks noGrp="1"/>
+          </p:cNvSpPr>
+          <p:nvPr>
+            <p:ph idx="1"/>
+          </p:nvPr>
+        </p:nvSpPr>
+        <p:spPr>
+          <a:xfrm>
+            <a:off x="617537" y="2097088"/>
+            <a:ext cx="2648073" cy="3541714"/>
+          </a:xfrm>
+        </p:spPr>
+        <p:txBody>
+          <a:bodyPr>
+            <a:normAutofit fontScale="92500" lnSpcReduction="10000"/>
+          </a:bodyPr>
+          <a:lstStyle/>
+          <a:p>
+            <a:r>
+              <a:rPr lang="en-US" dirty="0"/>
+              <a:t>Testing the OP Simulation, CPU generally faster for small circuits</a:t>
+            </a:r>
+          </a:p>
+          <a:p>
+            <a:r>
+              <a:rPr lang="en-US" dirty="0"/>
+              <a:t>For larger circuits (e.g. 1000 nodes) optimized CUDA has better performance</a:t>
+            </a:r>
+          </a:p>
+          <a:p>
+            <a:endParaRPr lang="en-US" dirty="0"/>
+          </a:p>
+        </p:txBody>
+      </p:sp>
+      <p:pic>
+        <p:nvPicPr>
+          <p:cNvPr id="5" name="Picture 4">
+            <a:extLst>
+              <a:ext uri="{FF2B5EF4-FFF2-40B4-BE49-F238E27FC236}">
+                <a16:creationId xmlns:a16="http://schemas.microsoft.com/office/drawing/2014/main" id="{A77C82B4-CC1F-4A57-A9B1-52616ADA8F77}"/>
+              </a:ext>
+            </a:extLst>
+          </p:cNvPr>
+          <p:cNvPicPr>
+            <a:picLocks noChangeAspect="1"/>
+          </p:cNvPicPr>
+          <p:nvPr/>
+        </p:nvPicPr>
+        <p:blipFill>
+          <a:blip r:embed="rId2">
+            <a:extLst>
+              <a:ext uri="{28A0092B-C50C-407E-A947-70E740481C1C}">
+                <a14:useLocalDpi xmlns:a14="http://schemas.microsoft.com/office/drawing/2010/main" val="0"/>
+              </a:ext>
+            </a:extLst>
+          </a:blip>
+          <a:stretch>
+            <a:fillRect/>
+          </a:stretch>
+        </p:blipFill>
+        <p:spPr>
+          <a:xfrm>
+            <a:off x="7798799" y="3575657"/>
+            <a:ext cx="4286555" cy="2542027"/>
+          </a:xfrm>
+          <a:prstGeom prst="rect">
+            <a:avLst/>
+          </a:prstGeom>
+        </p:spPr>
+      </p:pic>
+      <p:pic>
+        <p:nvPicPr>
+          <p:cNvPr id="9" name="Picture 8">
+            <a:extLst>
+              <a:ext uri="{FF2B5EF4-FFF2-40B4-BE49-F238E27FC236}">
+                <a16:creationId xmlns:a16="http://schemas.microsoft.com/office/drawing/2014/main" id="{B3F58043-56B1-40CD-BFD1-98A5BA2D65BF}"/>
+              </a:ext>
+            </a:extLst>
+          </p:cNvPr>
+          <p:cNvPicPr>
+            <a:picLocks noChangeAspect="1"/>
+          </p:cNvPicPr>
+          <p:nvPr/>
+        </p:nvPicPr>
+        <p:blipFill>
+          <a:blip r:embed="rId3">
+            <a:extLst>
+              <a:ext uri="{28A0092B-C50C-407E-A947-70E740481C1C}">
+                <a14:useLocalDpi xmlns:a14="http://schemas.microsoft.com/office/drawing/2010/main" val="0"/>
+              </a:ext>
+            </a:extLst>
+          </a:blip>
+          <a:stretch>
+            <a:fillRect/>
+          </a:stretch>
+        </p:blipFill>
+        <p:spPr>
+          <a:xfrm>
+            <a:off x="3555027" y="3575656"/>
+            <a:ext cx="4243772" cy="2542027"/>
+          </a:xfrm>
+          <a:prstGeom prst="rect">
+            <a:avLst/>
+          </a:prstGeom>
+        </p:spPr>
+      </p:pic>
+      <p:pic>
+        <p:nvPicPr>
+          <p:cNvPr id="7" name="Picture 6">
+            <a:extLst>
+              <a:ext uri="{FF2B5EF4-FFF2-40B4-BE49-F238E27FC236}">
+                <a16:creationId xmlns:a16="http://schemas.microsoft.com/office/drawing/2014/main" id="{0B86F851-C0C3-4D5C-B302-B48B954C4177}"/>
+              </a:ext>
+            </a:extLst>
+          </p:cNvPr>
+          <p:cNvPicPr>
+            <a:picLocks noChangeAspect="1"/>
+          </p:cNvPicPr>
+          <p:nvPr/>
+        </p:nvPicPr>
+        <p:blipFill>
+          <a:blip r:embed="rId4">
+            <a:extLst>
+              <a:ext uri="{28A0092B-C50C-407E-A947-70E740481C1C}">
+                <a14:useLocalDpi xmlns:a14="http://schemas.microsoft.com/office/drawing/2010/main" val="0"/>
+              </a:ext>
+            </a:extLst>
+          </a:blip>
+          <a:stretch>
+            <a:fillRect/>
+          </a:stretch>
+        </p:blipFill>
+        <p:spPr>
+          <a:xfrm>
+            <a:off x="5676913" y="1033628"/>
+            <a:ext cx="4241433" cy="2542027"/>
+          </a:xfrm>
+          <a:prstGeom prst="rect">
+            <a:avLst/>
+          </a:prstGeom>
+        </p:spPr>
+      </p:pic>
+    </p:spTree>
+    <p:extLst>
+      <p:ext uri="{BB962C8B-B14F-4D97-AF65-F5344CB8AC3E}">
+        <p14:creationId xmlns:p14="http://schemas.microsoft.com/office/powerpoint/2010/main" val="201639895"/>
+      </p:ext>
+    </p:extLst>
+  </p:cSld>
+  <p:clrMapOvr>
+    <a:masterClrMapping/>
+  </p:clrMapOvr>
+</p:sld>
+</file>
+
+<file path=ppt/slides/slide6.xml><?xml version="1.0" encoding="utf-8"?>
 <p:sld xmlns:a="http://schemas.openxmlformats.org/drawingml/2006/main" xmlns:r="http://schemas.openxmlformats.org/officeDocument/2006/relationships" xmlns:p="http://schemas.openxmlformats.org/presentationml/2006/main">
   <p:cSld>
     <p:spTree>
@@ -12780,36 +13165,6 @@
     <p:extLst>
       <p:ext uri="{BB962C8B-B14F-4D97-AF65-F5344CB8AC3E}">
         <p14:creationId xmlns:p14="http://schemas.microsoft.com/office/powerpoint/2010/main" val="2030369395"/>
-      </p:ext>
-    </p:extLst>
-  </p:cSld>
-  <p:clrMapOvr>
-    <a:masterClrMapping/>
-  </p:clrMapOvr>
-</p:sld>
-</file>
-
-<file path=ppt/slides/slide5.xml><?xml version="1.0" encoding="utf-8"?>
-<p:sld xmlns:a="http://schemas.openxmlformats.org/drawingml/2006/main" xmlns:r="http://schemas.openxmlformats.org/officeDocument/2006/relationships" xmlns:p="http://schemas.openxmlformats.org/presentationml/2006/main">
-  <p:cSld>
-    <p:spTree>
-      <p:nvGrpSpPr>
-        <p:cNvPr id="1" name=""/>
-        <p:cNvGrpSpPr/>
-        <p:nvPr/>
-      </p:nvGrpSpPr>
-      <p:grpSpPr>
-        <a:xfrm>
-          <a:off x="0" y="0"/>
-          <a:ext cx="0" cy="0"/>
-          <a:chOff x="0" y="0"/>
-          <a:chExt cx="0" cy="0"/>
-        </a:xfrm>
-      </p:grpSpPr>
-    </p:spTree>
-    <p:extLst>
-      <p:ext uri="{BB962C8B-B14F-4D97-AF65-F5344CB8AC3E}">
-        <p14:creationId xmlns:p14="http://schemas.microsoft.com/office/powerpoint/2010/main" val="5450685"/>
       </p:ext>
     </p:extLst>
   </p:cSld>

</xml_diff>